<commit_message>
added notes for career trajectories
</commit_message>
<xml_diff>
--- a/notes/Week7-academia.pptx
+++ b/notes/Week7-academia.pptx
@@ -240,7 +240,7 @@
           <a:p>
             <a:fld id="{C94BF1D3-5036-4D1A-A3B2-025E6980F662}" type="datetimeFigureOut">
               <a:rPr lang="en-US" smtClean="0"/>
-              <a:t>10/8/2020</a:t>
+              <a:t>10/19/2020</a:t>
             </a:fld>
             <a:endParaRPr lang="en-US"/>
           </a:p>
@@ -405,7 +405,7 @@
           <a:p>
             <a:fld id="{FD852303-BCF1-4F7F-83D3-C9EE5BF074C9}" type="datetimeFigureOut">
               <a:rPr lang="en-US" smtClean="0"/>
-              <a:t>10/8/2020</a:t>
+              <a:t>10/19/2020</a:t>
             </a:fld>
             <a:endParaRPr lang="en-US"/>
           </a:p>

</xml_diff>

<commit_message>
Updated several weeks of lecture notes
</commit_message>
<xml_diff>
--- a/notes/Week7-academia.pptx
+++ b/notes/Week7-academia.pptx
@@ -5,23 +5,24 @@
     <p:sldMasterId id="2147483660" r:id="rId1"/>
   </p:sldMasterIdLst>
   <p:notesMasterIdLst>
-    <p:notesMasterId r:id="rId13"/>
+    <p:notesMasterId r:id="rId14"/>
   </p:notesMasterIdLst>
   <p:handoutMasterIdLst>
-    <p:handoutMasterId r:id="rId14"/>
+    <p:handoutMasterId r:id="rId15"/>
   </p:handoutMasterIdLst>
   <p:sldIdLst>
     <p:sldId id="264" r:id="rId2"/>
-    <p:sldId id="265" r:id="rId3"/>
-    <p:sldId id="266" r:id="rId4"/>
-    <p:sldId id="267" r:id="rId5"/>
-    <p:sldId id="268" r:id="rId6"/>
-    <p:sldId id="269" r:id="rId7"/>
-    <p:sldId id="270" r:id="rId8"/>
-    <p:sldId id="272" r:id="rId9"/>
-    <p:sldId id="271" r:id="rId10"/>
-    <p:sldId id="273" r:id="rId11"/>
-    <p:sldId id="275" r:id="rId12"/>
+    <p:sldId id="276" r:id="rId3"/>
+    <p:sldId id="265" r:id="rId4"/>
+    <p:sldId id="266" r:id="rId5"/>
+    <p:sldId id="267" r:id="rId6"/>
+    <p:sldId id="268" r:id="rId7"/>
+    <p:sldId id="269" r:id="rId8"/>
+    <p:sldId id="270" r:id="rId9"/>
+    <p:sldId id="272" r:id="rId10"/>
+    <p:sldId id="271" r:id="rId11"/>
+    <p:sldId id="273" r:id="rId12"/>
+    <p:sldId id="275" r:id="rId13"/>
   </p:sldIdLst>
   <p:sldSz cx="12161838" cy="6858000"/>
   <p:notesSz cx="7023100" cy="9309100"/>
@@ -240,7 +241,7 @@
           <a:p>
             <a:fld id="{C94BF1D3-5036-4D1A-A3B2-025E6980F662}" type="datetimeFigureOut">
               <a:rPr lang="en-US" smtClean="0"/>
-              <a:t>10/19/2020</a:t>
+              <a:t>10/20/2020</a:t>
             </a:fld>
             <a:endParaRPr lang="en-US"/>
           </a:p>
@@ -405,7 +406,7 @@
           <a:p>
             <a:fld id="{FD852303-BCF1-4F7F-83D3-C9EE5BF074C9}" type="datetimeFigureOut">
               <a:rPr lang="en-US" smtClean="0"/>
-              <a:t>10/19/2020</a:t>
+              <a:t>10/20/2020</a:t>
             </a:fld>
             <a:endParaRPr lang="en-US"/>
           </a:p>
@@ -4696,7 +4697,7 @@
           <p:cNvPr id="2" name="Title 1">
             <a:extLst>
               <a:ext uri="{FF2B5EF4-FFF2-40B4-BE49-F238E27FC236}">
-                <a16:creationId xmlns:a16="http://schemas.microsoft.com/office/drawing/2014/main" id="{761B8271-39BE-4894-91F7-FE7D30CEA2E7}"/>
+                <a16:creationId xmlns:a16="http://schemas.microsoft.com/office/drawing/2014/main" id="{A7548868-9DD5-452B-A68B-C45A6FD63725}"/>
               </a:ext>
             </a:extLst>
           </p:cNvPr>
@@ -4714,7 +4715,7 @@
           <a:p>
             <a:r>
               <a:rPr lang="en-US" dirty="0"/>
-              <a:t>Teaching</a:t>
+              <a:t>Paying for Graduate School</a:t>
             </a:r>
           </a:p>
         </p:txBody>
@@ -4724,7 +4725,7 @@
           <p:cNvPr id="3" name="Text Placeholder 2">
             <a:extLst>
               <a:ext uri="{FF2B5EF4-FFF2-40B4-BE49-F238E27FC236}">
-                <a16:creationId xmlns:a16="http://schemas.microsoft.com/office/drawing/2014/main" id="{5E3564B8-53AB-4EE1-A8F8-866AB848D32D}"/>
+                <a16:creationId xmlns:a16="http://schemas.microsoft.com/office/drawing/2014/main" id="{EC62A7A3-0AD3-4B35-BAC2-48029F34D174}"/>
               </a:ext>
             </a:extLst>
           </p:cNvPr>
@@ -4742,55 +4743,62 @@
           <a:p>
             <a:r>
               <a:rPr lang="en-US" dirty="0"/>
-              <a:t>Primary / High School</a:t>
+              <a:t>You should not be paying full-price for graduate school in Computer Science</a:t>
             </a:r>
           </a:p>
           <a:p>
             <a:pPr lvl="1"/>
             <a:r>
               <a:rPr lang="en-US" dirty="0"/>
-              <a:t>Get a minor / dual major in Education</a:t>
+              <a:t>Education support from your employer</a:t>
+            </a:r>
+          </a:p>
+          <a:p>
+            <a:pPr lvl="2"/>
+            <a:r>
+              <a:rPr lang="en-US" dirty="0"/>
+              <a:t>Most commonly for master’s students</a:t>
+            </a:r>
+          </a:p>
+          <a:p>
+            <a:pPr lvl="2"/>
+            <a:r>
+              <a:rPr lang="en-US" dirty="0"/>
+              <a:t>They cover part of your tuition while you continue working for them</a:t>
             </a:r>
           </a:p>
           <a:p>
             <a:pPr lvl="1"/>
             <a:r>
               <a:rPr lang="en-US" dirty="0"/>
-              <a:t>Consider a Master of Education: </a:t>
-            </a:r>
-            <a:r>
-              <a:rPr lang="en-US" dirty="0">
-                <a:hlinkClick r:id="rId2"/>
-              </a:rPr>
-              <a:t>https://gps.uml.edu/degrees/grad/online-master-education-curriculum-instruction-degree-initial-teacher-license.cfm</a:t>
-            </a:r>
-            <a:endParaRPr lang="en-US" dirty="0"/>
+              <a:t>Tuition credits from the university</a:t>
+            </a:r>
+          </a:p>
+          <a:p>
+            <a:pPr lvl="2"/>
+            <a:r>
+              <a:rPr lang="en-US" dirty="0"/>
+              <a:t>Research Assistant (RA) or Teaching Assistant (TA) positions</a:t>
+            </a:r>
+          </a:p>
+          <a:p>
+            <a:pPr lvl="2"/>
+            <a:r>
+              <a:rPr lang="en-US" dirty="0"/>
+              <a:t>The university pays you a small stipend and waives your tuition</a:t>
+            </a:r>
+          </a:p>
+          <a:p>
+            <a:r>
+              <a:rPr lang="en-US" dirty="0"/>
+              <a:t>Many schools have TA unions</a:t>
+            </a:r>
           </a:p>
           <a:p>
             <a:pPr lvl="1"/>
             <a:r>
               <a:rPr lang="en-US" dirty="0"/>
-              <a:t>You will likely need to receive teaching certification</a:t>
-            </a:r>
-          </a:p>
-          <a:p>
-            <a:r>
-              <a:rPr lang="en-US" dirty="0"/>
-              <a:t>College / University</a:t>
-            </a:r>
-          </a:p>
-          <a:p>
-            <a:pPr lvl="1"/>
-            <a:r>
-              <a:rPr lang="en-US" dirty="0"/>
-              <a:t>Most require a Ph.D.</a:t>
-            </a:r>
-          </a:p>
-          <a:p>
-            <a:pPr lvl="1"/>
-            <a:r>
-              <a:rPr lang="en-US" dirty="0"/>
-              <a:t>Be sure to take a few education classes and take a TA-position with in-class experience</a:t>
+              <a:t>Tend to have better pay and benefits</a:t>
             </a:r>
           </a:p>
         </p:txBody>
@@ -4800,7 +4808,7 @@
           <p:cNvPr id="4" name="Slide Number Placeholder 3">
             <a:extLst>
               <a:ext uri="{FF2B5EF4-FFF2-40B4-BE49-F238E27FC236}">
-                <a16:creationId xmlns:a16="http://schemas.microsoft.com/office/drawing/2014/main" id="{85B7FBD7-6BE1-474B-BB60-4290DE7A736E}"/>
+                <a16:creationId xmlns:a16="http://schemas.microsoft.com/office/drawing/2014/main" id="{7288F4CE-DFEB-4FCD-8FC1-A5E2C8EA3859}"/>
               </a:ext>
             </a:extLst>
           </p:cNvPr>
@@ -4828,7 +4836,7 @@
     </p:spTree>
     <p:extLst>
       <p:ext uri="{BB962C8B-B14F-4D97-AF65-F5344CB8AC3E}">
-        <p14:creationId xmlns:p14="http://schemas.microsoft.com/office/powerpoint/2010/main" val="100961151"/>
+        <p14:creationId xmlns:p14="http://schemas.microsoft.com/office/powerpoint/2010/main" val="1941390288"/>
       </p:ext>
     </p:extLst>
   </p:cSld>
@@ -4857,6 +4865,170 @@
       </p:grpSpPr>
       <p:sp>
         <p:nvSpPr>
+          <p:cNvPr id="2" name="Title 1">
+            <a:extLst>
+              <a:ext uri="{FF2B5EF4-FFF2-40B4-BE49-F238E27FC236}">
+                <a16:creationId xmlns:a16="http://schemas.microsoft.com/office/drawing/2014/main" id="{761B8271-39BE-4894-91F7-FE7D30CEA2E7}"/>
+              </a:ext>
+            </a:extLst>
+          </p:cNvPr>
+          <p:cNvSpPr>
+            <a:spLocks noGrp="1"/>
+          </p:cNvSpPr>
+          <p:nvPr>
+            <p:ph type="title"/>
+          </p:nvPr>
+        </p:nvSpPr>
+        <p:spPr/>
+        <p:txBody>
+          <a:bodyPr/>
+          <a:lstStyle/>
+          <a:p>
+            <a:r>
+              <a:rPr lang="en-US" dirty="0"/>
+              <a:t>Teaching</a:t>
+            </a:r>
+          </a:p>
+        </p:txBody>
+      </p:sp>
+      <p:sp>
+        <p:nvSpPr>
+          <p:cNvPr id="3" name="Text Placeholder 2">
+            <a:extLst>
+              <a:ext uri="{FF2B5EF4-FFF2-40B4-BE49-F238E27FC236}">
+                <a16:creationId xmlns:a16="http://schemas.microsoft.com/office/drawing/2014/main" id="{5E3564B8-53AB-4EE1-A8F8-866AB848D32D}"/>
+              </a:ext>
+            </a:extLst>
+          </p:cNvPr>
+          <p:cNvSpPr>
+            <a:spLocks noGrp="1"/>
+          </p:cNvSpPr>
+          <p:nvPr>
+            <p:ph type="body" sz="quarter" idx="11"/>
+          </p:nvPr>
+        </p:nvSpPr>
+        <p:spPr/>
+        <p:txBody>
+          <a:bodyPr/>
+          <a:lstStyle/>
+          <a:p>
+            <a:r>
+              <a:rPr lang="en-US" dirty="0"/>
+              <a:t>Primary / High School</a:t>
+            </a:r>
+          </a:p>
+          <a:p>
+            <a:pPr lvl="1"/>
+            <a:r>
+              <a:rPr lang="en-US" dirty="0"/>
+              <a:t>Get a minor / dual major in Education</a:t>
+            </a:r>
+          </a:p>
+          <a:p>
+            <a:pPr lvl="1"/>
+            <a:r>
+              <a:rPr lang="en-US" dirty="0"/>
+              <a:t>Consider a Master of Education: </a:t>
+            </a:r>
+            <a:r>
+              <a:rPr lang="en-US" dirty="0">
+                <a:hlinkClick r:id="rId2"/>
+              </a:rPr>
+              <a:t>https://gps.uml.edu/degrees/grad/online-master-education-curriculum-instruction-degree-initial-teacher-license.cfm</a:t>
+            </a:r>
+            <a:endParaRPr lang="en-US" dirty="0"/>
+          </a:p>
+          <a:p>
+            <a:pPr lvl="1"/>
+            <a:r>
+              <a:rPr lang="en-US" dirty="0"/>
+              <a:t>You will likely need to receive teaching certification</a:t>
+            </a:r>
+          </a:p>
+          <a:p>
+            <a:r>
+              <a:rPr lang="en-US" dirty="0"/>
+              <a:t>College / University</a:t>
+            </a:r>
+          </a:p>
+          <a:p>
+            <a:pPr lvl="1"/>
+            <a:r>
+              <a:rPr lang="en-US" dirty="0"/>
+              <a:t>Most require a Ph.D.</a:t>
+            </a:r>
+          </a:p>
+          <a:p>
+            <a:pPr lvl="1"/>
+            <a:r>
+              <a:rPr lang="en-US" dirty="0"/>
+              <a:t>Be sure to take a few education classes and take a TA-position with in-class experience</a:t>
+            </a:r>
+          </a:p>
+        </p:txBody>
+      </p:sp>
+      <p:sp>
+        <p:nvSpPr>
+          <p:cNvPr id="4" name="Slide Number Placeholder 3">
+            <a:extLst>
+              <a:ext uri="{FF2B5EF4-FFF2-40B4-BE49-F238E27FC236}">
+                <a16:creationId xmlns:a16="http://schemas.microsoft.com/office/drawing/2014/main" id="{85B7FBD7-6BE1-474B-BB60-4290DE7A736E}"/>
+              </a:ext>
+            </a:extLst>
+          </p:cNvPr>
+          <p:cNvSpPr>
+            <a:spLocks noGrp="1"/>
+          </p:cNvSpPr>
+          <p:nvPr>
+            <p:ph type="sldNum" sz="quarter" idx="12"/>
+          </p:nvPr>
+        </p:nvSpPr>
+        <p:spPr/>
+        <p:txBody>
+          <a:bodyPr/>
+          <a:lstStyle/>
+          <a:p>
+            <a:fld id="{0FA920F7-7227-4D6E-B7C6-AC05743CC8F3}" type="slidenum">
+              <a:rPr lang="en-US" smtClean="0"/>
+              <a:pPr/>
+              <a:t>11</a:t>
+            </a:fld>
+            <a:endParaRPr lang="en-US" dirty="0"/>
+          </a:p>
+        </p:txBody>
+      </p:sp>
+    </p:spTree>
+    <p:extLst>
+      <p:ext uri="{BB962C8B-B14F-4D97-AF65-F5344CB8AC3E}">
+        <p14:creationId xmlns:p14="http://schemas.microsoft.com/office/powerpoint/2010/main" val="100961151"/>
+      </p:ext>
+    </p:extLst>
+  </p:cSld>
+  <p:clrMapOvr>
+    <a:masterClrMapping/>
+  </p:clrMapOvr>
+</p:sld>
+</file>
+
+<file path=ppt/slides/slide12.xml><?xml version="1.0" encoding="utf-8"?>
+<p:sld xmlns:a="http://schemas.openxmlformats.org/drawingml/2006/main" xmlns:r="http://schemas.openxmlformats.org/officeDocument/2006/relationships" xmlns:p="http://schemas.openxmlformats.org/presentationml/2006/main">
+  <p:cSld>
+    <p:spTree>
+      <p:nvGrpSpPr>
+        <p:cNvPr id="1" name=""/>
+        <p:cNvGrpSpPr/>
+        <p:nvPr/>
+      </p:nvGrpSpPr>
+      <p:grpSpPr>
+        <a:xfrm>
+          <a:off x="0" y="0"/>
+          <a:ext cx="0" cy="0"/>
+          <a:chOff x="0" y="0"/>
+          <a:chExt cx="0" cy="0"/>
+        </a:xfrm>
+      </p:grpSpPr>
+      <p:sp>
+        <p:nvSpPr>
           <p:cNvPr id="5" name="Title 4">
             <a:extLst>
               <a:ext uri="{FF2B5EF4-FFF2-40B4-BE49-F238E27FC236}">
@@ -4932,7 +5104,7 @@
             <a:fld id="{0FA920F7-7227-4D6E-B7C6-AC05743CC8F3}" type="slidenum">
               <a:rPr lang="en-US" smtClean="0"/>
               <a:pPr/>
-              <a:t>11</a:t>
+              <a:t>12</a:t>
             </a:fld>
             <a:endParaRPr lang="en-US" dirty="0"/>
           </a:p>
@@ -4970,10 +5142,10 @@
       </p:grpSpPr>
       <p:sp>
         <p:nvSpPr>
-          <p:cNvPr id="5" name="Title 4">
+          <p:cNvPr id="2" name="Title 1">
             <a:extLst>
               <a:ext uri="{FF2B5EF4-FFF2-40B4-BE49-F238E27FC236}">
-                <a16:creationId xmlns:a16="http://schemas.microsoft.com/office/drawing/2014/main" id="{E0655BF5-8C0F-4C6F-8D8C-5AB2C1C7F402}"/>
+                <a16:creationId xmlns:a16="http://schemas.microsoft.com/office/drawing/2014/main" id="{6F725BC1-DCC4-4BF8-85F2-4C8B3F911148}"/>
               </a:ext>
             </a:extLst>
           </p:cNvPr>
@@ -4991,17 +5163,17 @@
           <a:p>
             <a:r>
               <a:rPr lang="en-US" dirty="0"/>
-              <a:t>Academia</a:t>
-            </a:r>
-          </a:p>
-        </p:txBody>
-      </p:sp>
-      <p:sp>
-        <p:nvSpPr>
-          <p:cNvPr id="6" name="Text Placeholder 5">
+              <a:t>Homework 4</a:t>
+            </a:r>
+          </a:p>
+        </p:txBody>
+      </p:sp>
+      <p:sp>
+        <p:nvSpPr>
+          <p:cNvPr id="3" name="Text Placeholder 2">
             <a:extLst>
               <a:ext uri="{FF2B5EF4-FFF2-40B4-BE49-F238E27FC236}">
-                <a16:creationId xmlns:a16="http://schemas.microsoft.com/office/drawing/2014/main" id="{0FC4BA0C-922B-440C-AE05-DFFB715544A7}"/>
+                <a16:creationId xmlns:a16="http://schemas.microsoft.com/office/drawing/2014/main" id="{EB552B25-C4E9-466B-BA4D-B1C54EDF30F9}"/>
               </a:ext>
             </a:extLst>
           </p:cNvPr>
@@ -5019,36 +5191,39 @@
           <a:p>
             <a:r>
               <a:rPr lang="en-US" dirty="0"/>
-              <a:t>Graduate school</a:t>
-            </a:r>
-          </a:p>
-          <a:p>
-            <a:r>
-              <a:rPr lang="en-US" dirty="0"/>
-              <a:t>What is research?</a:t>
-            </a:r>
+              <a:t>Due Wednesday, October 28</a:t>
+            </a:r>
+          </a:p>
+          <a:p>
+            <a:r>
+              <a:rPr lang="en-US" dirty="0"/>
+              <a:t>Read two sections from </a:t>
+            </a:r>
+            <a:r>
+              <a:rPr lang="en-US" i="1" dirty="0"/>
+              <a:t>the Pragmatic Programmer</a:t>
+            </a:r>
+            <a:endParaRPr lang="en-US" dirty="0"/>
           </a:p>
           <a:p>
             <a:pPr lvl="1"/>
             <a:r>
               <a:rPr lang="en-US" dirty="0"/>
-              <a:t>How do I get into it?</a:t>
-            </a:r>
-          </a:p>
-          <a:p>
-            <a:r>
-              <a:rPr lang="en-US" dirty="0"/>
-              <a:t>How do I become a professor?</a:t>
-            </a:r>
-          </a:p>
-          <a:p>
-            <a:r>
-              <a:rPr lang="en-US" dirty="0"/>
-              <a:t>My research</a:t>
-            </a:r>
-          </a:p>
-          <a:p>
-            <a:endParaRPr lang="en-US" dirty="0"/>
+              <a:t>It’s a very good book</a:t>
+            </a:r>
+          </a:p>
+          <a:p>
+            <a:pPr lvl="1"/>
+            <a:r>
+              <a:rPr lang="en-US" dirty="0"/>
+              <a:t>Some of it is useful now</a:t>
+            </a:r>
+          </a:p>
+          <a:p>
+            <a:r>
+              <a:rPr lang="en-US" dirty="0"/>
+              <a:t>Reflect on your approach to programming</a:t>
+            </a:r>
           </a:p>
         </p:txBody>
       </p:sp>
@@ -5057,7 +5232,7 @@
           <p:cNvPr id="4" name="Slide Number Placeholder 3">
             <a:extLst>
               <a:ext uri="{FF2B5EF4-FFF2-40B4-BE49-F238E27FC236}">
-                <a16:creationId xmlns:a16="http://schemas.microsoft.com/office/drawing/2014/main" id="{8818E367-0BA9-491A-A9D4-8912CDE8C50A}"/>
+                <a16:creationId xmlns:a16="http://schemas.microsoft.com/office/drawing/2014/main" id="{C809C247-EAB0-4115-BD2D-C416EBB0FF31}"/>
               </a:ext>
             </a:extLst>
           </p:cNvPr>
@@ -5085,7 +5260,7 @@
     </p:spTree>
     <p:extLst>
       <p:ext uri="{BB962C8B-B14F-4D97-AF65-F5344CB8AC3E}">
-        <p14:creationId xmlns:p14="http://schemas.microsoft.com/office/powerpoint/2010/main" val="259821854"/>
+        <p14:creationId xmlns:p14="http://schemas.microsoft.com/office/powerpoint/2010/main" val="459589673"/>
       </p:ext>
     </p:extLst>
   </p:cSld>
@@ -5114,10 +5289,10 @@
       </p:grpSpPr>
       <p:sp>
         <p:nvSpPr>
-          <p:cNvPr id="2" name="Title 1">
+          <p:cNvPr id="5" name="Title 4">
             <a:extLst>
               <a:ext uri="{FF2B5EF4-FFF2-40B4-BE49-F238E27FC236}">
-                <a16:creationId xmlns:a16="http://schemas.microsoft.com/office/drawing/2014/main" id="{5B49134C-4377-4460-877E-EBA969C4F56C}"/>
+                <a16:creationId xmlns:a16="http://schemas.microsoft.com/office/drawing/2014/main" id="{E0655BF5-8C0F-4C6F-8D8C-5AB2C1C7F402}"/>
               </a:ext>
             </a:extLst>
           </p:cNvPr>
@@ -5135,17 +5310,17 @@
           <a:p>
             <a:r>
               <a:rPr lang="en-US" dirty="0"/>
-              <a:t>Graduate School</a:t>
-            </a:r>
-          </a:p>
-        </p:txBody>
-      </p:sp>
-      <p:sp>
-        <p:nvSpPr>
-          <p:cNvPr id="3" name="Text Placeholder 2">
+              <a:t>Academia</a:t>
+            </a:r>
+          </a:p>
+        </p:txBody>
+      </p:sp>
+      <p:sp>
+        <p:nvSpPr>
+          <p:cNvPr id="6" name="Text Placeholder 5">
             <a:extLst>
               <a:ext uri="{FF2B5EF4-FFF2-40B4-BE49-F238E27FC236}">
-                <a16:creationId xmlns:a16="http://schemas.microsoft.com/office/drawing/2014/main" id="{2263D9AE-981C-4D4C-8F1C-C15B6C2C44DA}"/>
+                <a16:creationId xmlns:a16="http://schemas.microsoft.com/office/drawing/2014/main" id="{0FC4BA0C-922B-440C-AE05-DFFB715544A7}"/>
               </a:ext>
             </a:extLst>
           </p:cNvPr>
@@ -5163,75 +5338,36 @@
           <a:p>
             <a:r>
               <a:rPr lang="en-US" dirty="0"/>
-              <a:t>You are at UMass Lowell for a Bachelor’s degree</a:t>
+              <a:t>Graduate school</a:t>
+            </a:r>
+          </a:p>
+          <a:p>
+            <a:r>
+              <a:rPr lang="en-US" dirty="0"/>
+              <a:t>What is research?</a:t>
             </a:r>
           </a:p>
           <a:p>
             <a:pPr lvl="1"/>
             <a:r>
               <a:rPr lang="en-US" dirty="0"/>
-              <a:t>Bachelor’s of Science (B.S.)</a:t>
-            </a:r>
-          </a:p>
-          <a:p>
-            <a:pPr lvl="1"/>
-            <a:r>
-              <a:rPr lang="en-US" dirty="0"/>
-              <a:t>Bachelor’s of Art (B.A.)</a:t>
-            </a:r>
-          </a:p>
-          <a:p>
-            <a:r>
-              <a:rPr lang="en-US" dirty="0"/>
-              <a:t>These are undergraduate degrees</a:t>
-            </a:r>
-          </a:p>
-          <a:p>
-            <a:r>
-              <a:rPr lang="en-US" dirty="0"/>
-              <a:t>There are other degrees that you can continue to earn (graduate degrees)</a:t>
-            </a:r>
-          </a:p>
-          <a:p>
-            <a:pPr lvl="1"/>
-            <a:r>
-              <a:rPr lang="en-US" dirty="0"/>
-              <a:t>Masters of Science (M.S.) or Art (M.A.)</a:t>
-            </a:r>
-          </a:p>
-          <a:p>
-            <a:pPr lvl="1"/>
-            <a:r>
-              <a:rPr lang="en-US" dirty="0"/>
-              <a:t>Doctor of Philosophy (Ph.D.)</a:t>
-            </a:r>
-          </a:p>
-          <a:p>
-            <a:r>
-              <a:rPr lang="en-US" dirty="0"/>
-              <a:t>Other graduate degrees</a:t>
-            </a:r>
-          </a:p>
-          <a:p>
-            <a:pPr lvl="1"/>
-            <a:r>
-              <a:rPr lang="en-US" dirty="0"/>
-              <a:t>Masters of Business Administration (M.B.A.)</a:t>
-            </a:r>
-          </a:p>
-          <a:p>
-            <a:pPr lvl="1"/>
-            <a:r>
-              <a:rPr lang="en-US" dirty="0"/>
-              <a:t>Medical / Doctor of Medicine (M.D.)</a:t>
-            </a:r>
-          </a:p>
-          <a:p>
-            <a:pPr lvl="1"/>
-            <a:r>
-              <a:rPr lang="en-US" dirty="0"/>
-              <a:t>Law / Juris Doctor (J.D.)</a:t>
-            </a:r>
+              <a:t>How do I get into it?</a:t>
+            </a:r>
+          </a:p>
+          <a:p>
+            <a:r>
+              <a:rPr lang="en-US" dirty="0"/>
+              <a:t>How do I become a professor?</a:t>
+            </a:r>
+          </a:p>
+          <a:p>
+            <a:r>
+              <a:rPr lang="en-US" dirty="0"/>
+              <a:t>My research</a:t>
+            </a:r>
+          </a:p>
+          <a:p>
+            <a:endParaRPr lang="en-US" dirty="0"/>
           </a:p>
         </p:txBody>
       </p:sp>
@@ -5240,7 +5376,7 @@
           <p:cNvPr id="4" name="Slide Number Placeholder 3">
             <a:extLst>
               <a:ext uri="{FF2B5EF4-FFF2-40B4-BE49-F238E27FC236}">
-                <a16:creationId xmlns:a16="http://schemas.microsoft.com/office/drawing/2014/main" id="{AC55769A-9165-4030-AE44-5B755DFDD855}"/>
+                <a16:creationId xmlns:a16="http://schemas.microsoft.com/office/drawing/2014/main" id="{8818E367-0BA9-491A-A9D4-8912CDE8C50A}"/>
               </a:ext>
             </a:extLst>
           </p:cNvPr>
@@ -5268,7 +5404,7 @@
     </p:spTree>
     <p:extLst>
       <p:ext uri="{BB962C8B-B14F-4D97-AF65-F5344CB8AC3E}">
-        <p14:creationId xmlns:p14="http://schemas.microsoft.com/office/powerpoint/2010/main" val="1435376758"/>
+        <p14:creationId xmlns:p14="http://schemas.microsoft.com/office/powerpoint/2010/main" val="259821854"/>
       </p:ext>
     </p:extLst>
   </p:cSld>
@@ -5300,7 +5436,7 @@
           <p:cNvPr id="2" name="Title 1">
             <a:extLst>
               <a:ext uri="{FF2B5EF4-FFF2-40B4-BE49-F238E27FC236}">
-                <a16:creationId xmlns:a16="http://schemas.microsoft.com/office/drawing/2014/main" id="{27A36C64-DCE0-48F1-9F36-B298E0C75437}"/>
+                <a16:creationId xmlns:a16="http://schemas.microsoft.com/office/drawing/2014/main" id="{5B49134C-4377-4460-877E-EBA969C4F56C}"/>
               </a:ext>
             </a:extLst>
           </p:cNvPr>
@@ -5318,7 +5454,7 @@
           <a:p>
             <a:r>
               <a:rPr lang="en-US" dirty="0"/>
-              <a:t>Masters Degree</a:t>
+              <a:t>Graduate School</a:t>
             </a:r>
           </a:p>
         </p:txBody>
@@ -5328,7 +5464,7 @@
           <p:cNvPr id="3" name="Text Placeholder 2">
             <a:extLst>
               <a:ext uri="{FF2B5EF4-FFF2-40B4-BE49-F238E27FC236}">
-                <a16:creationId xmlns:a16="http://schemas.microsoft.com/office/drawing/2014/main" id="{75A17BCF-0599-4275-AA22-8503745F1439}"/>
+                <a16:creationId xmlns:a16="http://schemas.microsoft.com/office/drawing/2014/main" id="{2263D9AE-981C-4D4C-8F1C-C15B6C2C44DA}"/>
               </a:ext>
             </a:extLst>
           </p:cNvPr>
@@ -5346,64 +5482,74 @@
           <a:p>
             <a:r>
               <a:rPr lang="en-US" dirty="0"/>
-              <a:t>Usually ~2 years after completing your Bachelors</a:t>
+              <a:t>You are at UMass Lowell for a Bachelor’s degree</a:t>
             </a:r>
           </a:p>
           <a:p>
             <a:pPr lvl="1"/>
             <a:r>
               <a:rPr lang="en-US" dirty="0"/>
-              <a:t>Many schools offer 5 year BS+MS degree pathways (UML CS does)</a:t>
+              <a:t>Bachelor’s of Science (B.S.)</a:t>
             </a:r>
           </a:p>
           <a:p>
             <a:pPr lvl="1"/>
             <a:r>
-              <a:rPr lang="en-US" dirty="0">
-                <a:hlinkClick r:id="rId2"/>
-              </a:rPr>
-              <a:t>https://www.uml.edu/Sciences/computer-science/Programs/CS-BS-to-MS.aspx</a:t>
-            </a:r>
-            <a:endParaRPr lang="en-US" dirty="0"/>
-          </a:p>
-          <a:p>
-            <a:r>
-              <a:rPr lang="en-US" dirty="0"/>
-              <a:t>Learn more advanced and specialized skills within a given field</a:t>
+              <a:rPr lang="en-US" dirty="0"/>
+              <a:t>Bachelor’s of Art (B.A.)</a:t>
+            </a:r>
+          </a:p>
+          <a:p>
+            <a:r>
+              <a:rPr lang="en-US" dirty="0"/>
+              <a:t>These are undergraduate degrees</a:t>
+            </a:r>
+          </a:p>
+          <a:p>
+            <a:r>
+              <a:rPr lang="en-US" dirty="0"/>
+              <a:t>There are other degrees that you can continue to earn (graduate degrees)</a:t>
             </a:r>
           </a:p>
           <a:p>
             <a:pPr lvl="1"/>
             <a:r>
               <a:rPr lang="en-US" dirty="0"/>
-              <a:t>Some overlap with 400-level courses</a:t>
+              <a:t>Masters of Science (M.S.) or Art (M.A.)</a:t>
             </a:r>
           </a:p>
           <a:p>
             <a:pPr lvl="1"/>
             <a:r>
               <a:rPr lang="en-US" dirty="0"/>
-              <a:t>Usually a more intensive look into specific areas</a:t>
+              <a:t>Doctor of Philosophy (Ph.D.)</a:t>
+            </a:r>
+          </a:p>
+          <a:p>
+            <a:r>
+              <a:rPr lang="en-US" dirty="0"/>
+              <a:t>Other graduate degrees</a:t>
             </a:r>
           </a:p>
           <a:p>
             <a:pPr lvl="1"/>
             <a:r>
               <a:rPr lang="en-US" dirty="0"/>
-              <a:t>Advanced and/or cutting-edge techniques</a:t>
-            </a:r>
-          </a:p>
-          <a:p>
-            <a:r>
-              <a:rPr lang="en-US" dirty="0"/>
-              <a:t>Mostly earned by doing additional coursework</a:t>
+              <a:t>Masters of Business Administration (M.B.A.)</a:t>
             </a:r>
           </a:p>
           <a:p>
             <a:pPr lvl="1"/>
             <a:r>
               <a:rPr lang="en-US" dirty="0"/>
-              <a:t>Research masters also exist</a:t>
+              <a:t>Medical / Doctor of Medicine (M.D.)</a:t>
+            </a:r>
+          </a:p>
+          <a:p>
+            <a:pPr lvl="1"/>
+            <a:r>
+              <a:rPr lang="en-US" dirty="0"/>
+              <a:t>Law / Juris Doctor (J.D.)</a:t>
             </a:r>
           </a:p>
         </p:txBody>
@@ -5413,7 +5559,7 @@
           <p:cNvPr id="4" name="Slide Number Placeholder 3">
             <a:extLst>
               <a:ext uri="{FF2B5EF4-FFF2-40B4-BE49-F238E27FC236}">
-                <a16:creationId xmlns:a16="http://schemas.microsoft.com/office/drawing/2014/main" id="{9E657875-2908-414F-8A9F-182DAAA8A5AB}"/>
+                <a16:creationId xmlns:a16="http://schemas.microsoft.com/office/drawing/2014/main" id="{AC55769A-9165-4030-AE44-5B755DFDD855}"/>
               </a:ext>
             </a:extLst>
           </p:cNvPr>
@@ -5441,7 +5587,7 @@
     </p:spTree>
     <p:extLst>
       <p:ext uri="{BB962C8B-B14F-4D97-AF65-F5344CB8AC3E}">
-        <p14:creationId xmlns:p14="http://schemas.microsoft.com/office/powerpoint/2010/main" val="4158614470"/>
+        <p14:creationId xmlns:p14="http://schemas.microsoft.com/office/powerpoint/2010/main" val="1435376758"/>
       </p:ext>
     </p:extLst>
   </p:cSld>
@@ -5473,7 +5619,7 @@
           <p:cNvPr id="2" name="Title 1">
             <a:extLst>
               <a:ext uri="{FF2B5EF4-FFF2-40B4-BE49-F238E27FC236}">
-                <a16:creationId xmlns:a16="http://schemas.microsoft.com/office/drawing/2014/main" id="{9FE3CB6A-4E02-4CEA-B13E-7FC0AF2FF5FE}"/>
+                <a16:creationId xmlns:a16="http://schemas.microsoft.com/office/drawing/2014/main" id="{27A36C64-DCE0-48F1-9F36-B298E0C75437}"/>
               </a:ext>
             </a:extLst>
           </p:cNvPr>
@@ -5491,7 +5637,7 @@
           <a:p>
             <a:r>
               <a:rPr lang="en-US" dirty="0"/>
-              <a:t>Doctorate Degree (Ph.D.)</a:t>
+              <a:t>Masters Degree</a:t>
             </a:r>
           </a:p>
         </p:txBody>
@@ -5501,7 +5647,7 @@
           <p:cNvPr id="3" name="Text Placeholder 2">
             <a:extLst>
               <a:ext uri="{FF2B5EF4-FFF2-40B4-BE49-F238E27FC236}">
-                <a16:creationId xmlns:a16="http://schemas.microsoft.com/office/drawing/2014/main" id="{F023A324-F822-406F-AB46-01E5E3C4BC91}"/>
+                <a16:creationId xmlns:a16="http://schemas.microsoft.com/office/drawing/2014/main" id="{75A17BCF-0599-4275-AA22-8503745F1439}"/>
               </a:ext>
             </a:extLst>
           </p:cNvPr>
@@ -5519,73 +5665,64 @@
           <a:p>
             <a:r>
               <a:rPr lang="en-US" dirty="0"/>
-              <a:t>Terminal degree (don’t normally earn more degrees after this)</a:t>
-            </a:r>
-          </a:p>
-          <a:p>
-            <a:r>
-              <a:rPr lang="en-US" dirty="0"/>
-              <a:t>Requires producing original work (research)</a:t>
-            </a:r>
-          </a:p>
-          <a:p>
-            <a:r>
-              <a:rPr lang="en-US" dirty="0"/>
-              <a:t>Write a </a:t>
-            </a:r>
-            <a:r>
-              <a:rPr lang="en-US" i="1" dirty="0"/>
-              <a:t>thesis</a:t>
-            </a:r>
-            <a:r>
-              <a:rPr lang="en-US" dirty="0"/>
-              <a:t> and give a </a:t>
-            </a:r>
-            <a:r>
-              <a:rPr lang="en-US" i="1" dirty="0"/>
-              <a:t>dissertation</a:t>
+              <a:t>Usually ~2 years after completing your Bachelors</a:t>
+            </a:r>
+          </a:p>
+          <a:p>
+            <a:pPr lvl="1"/>
+            <a:r>
+              <a:rPr lang="en-US" dirty="0"/>
+              <a:t>Many schools offer 5 year BS+MS degree pathways (UML CS does)</a:t>
+            </a:r>
+          </a:p>
+          <a:p>
+            <a:pPr lvl="1"/>
+            <a:r>
+              <a:rPr lang="en-US" dirty="0">
+                <a:hlinkClick r:id="rId2"/>
+              </a:rPr>
+              <a:t>https://www.uml.edu/Sciences/computer-science/Programs/CS-BS-to-MS.aspx</a:t>
             </a:r>
             <a:endParaRPr lang="en-US" dirty="0"/>
           </a:p>
           <a:p>
+            <a:r>
+              <a:rPr lang="en-US" dirty="0"/>
+              <a:t>Learn more advanced and specialized skills within a given field</a:t>
+            </a:r>
+          </a:p>
+          <a:p>
             <a:pPr lvl="1"/>
             <a:r>
               <a:rPr lang="en-US" dirty="0"/>
-              <a:t>Thesis: book of your work</a:t>
+              <a:t>Some overlap with 400-level courses</a:t>
             </a:r>
           </a:p>
           <a:p>
             <a:pPr lvl="1"/>
             <a:r>
               <a:rPr lang="en-US" dirty="0"/>
-              <a:t>Dissertation: Presentation you give to experts in your field</a:t>
+              <a:t>Usually a more intensive look into specific areas</a:t>
             </a:r>
           </a:p>
           <a:p>
             <a:pPr lvl="1"/>
             <a:r>
               <a:rPr lang="en-US" dirty="0"/>
-              <a:t>Publish several academic papers along the way</a:t>
-            </a:r>
-          </a:p>
-          <a:p>
-            <a:r>
-              <a:rPr lang="en-US" dirty="0"/>
-              <a:t>Two types of programs	</a:t>
+              <a:t>Advanced and/or cutting-edge techniques</a:t>
+            </a:r>
+          </a:p>
+          <a:p>
+            <a:r>
+              <a:rPr lang="en-US" dirty="0"/>
+              <a:t>Mostly earned by doing additional coursework</a:t>
             </a:r>
           </a:p>
           <a:p>
             <a:pPr lvl="1"/>
             <a:r>
               <a:rPr lang="en-US" dirty="0"/>
-              <a:t>Masters + Ph.D. programs (5-7 years, involves coursework)</a:t>
-            </a:r>
-          </a:p>
-          <a:p>
-            <a:pPr lvl="1"/>
-            <a:r>
-              <a:rPr lang="en-US" dirty="0"/>
-              <a:t>Post-masters programs (3-5 years, little coursework)</a:t>
+              <a:t>Research masters also exist</a:t>
             </a:r>
           </a:p>
         </p:txBody>
@@ -5595,7 +5732,7 @@
           <p:cNvPr id="4" name="Slide Number Placeholder 3">
             <a:extLst>
               <a:ext uri="{FF2B5EF4-FFF2-40B4-BE49-F238E27FC236}">
-                <a16:creationId xmlns:a16="http://schemas.microsoft.com/office/drawing/2014/main" id="{4E44AF58-2D8C-4E55-A2CB-12C48E8DF438}"/>
+                <a16:creationId xmlns:a16="http://schemas.microsoft.com/office/drawing/2014/main" id="{9E657875-2908-414F-8A9F-182DAAA8A5AB}"/>
               </a:ext>
             </a:extLst>
           </p:cNvPr>
@@ -5623,7 +5760,7 @@
     </p:spTree>
     <p:extLst>
       <p:ext uri="{BB962C8B-B14F-4D97-AF65-F5344CB8AC3E}">
-        <p14:creationId xmlns:p14="http://schemas.microsoft.com/office/powerpoint/2010/main" val="1501386158"/>
+        <p14:creationId xmlns:p14="http://schemas.microsoft.com/office/powerpoint/2010/main" val="4158614470"/>
       </p:ext>
     </p:extLst>
   </p:cSld>
@@ -5655,7 +5792,7 @@
           <p:cNvPr id="2" name="Title 1">
             <a:extLst>
               <a:ext uri="{FF2B5EF4-FFF2-40B4-BE49-F238E27FC236}">
-                <a16:creationId xmlns:a16="http://schemas.microsoft.com/office/drawing/2014/main" id="{50C87B4B-7806-4E61-AD0F-85D33AF898CD}"/>
+                <a16:creationId xmlns:a16="http://schemas.microsoft.com/office/drawing/2014/main" id="{9FE3CB6A-4E02-4CEA-B13E-7FC0AF2FF5FE}"/>
               </a:ext>
             </a:extLst>
           </p:cNvPr>
@@ -5673,7 +5810,7 @@
           <a:p>
             <a:r>
               <a:rPr lang="en-US" dirty="0"/>
-              <a:t>Doctorate Degree (Ph.D.) Exams</a:t>
+              <a:t>Doctorate Degree (Ph.D.)</a:t>
             </a:r>
           </a:p>
         </p:txBody>
@@ -5683,7 +5820,7 @@
           <p:cNvPr id="3" name="Text Placeholder 2">
             <a:extLst>
               <a:ext uri="{FF2B5EF4-FFF2-40B4-BE49-F238E27FC236}">
-                <a16:creationId xmlns:a16="http://schemas.microsoft.com/office/drawing/2014/main" id="{5ACA2811-978E-4855-9569-2E199C025032}"/>
+                <a16:creationId xmlns:a16="http://schemas.microsoft.com/office/drawing/2014/main" id="{F023A324-F822-406F-AB46-01E5E3C4BC91}"/>
               </a:ext>
             </a:extLst>
           </p:cNvPr>
@@ -5701,68 +5838,73 @@
           <a:p>
             <a:r>
               <a:rPr lang="en-US" dirty="0"/>
-              <a:t>Qualifying exam (1-2 years in)</a:t>
-            </a:r>
+              <a:t>Terminal degree (don’t normally earn more degrees after this)</a:t>
+            </a:r>
+          </a:p>
+          <a:p>
+            <a:r>
+              <a:rPr lang="en-US" dirty="0"/>
+              <a:t>Requires producing original work (research)</a:t>
+            </a:r>
+          </a:p>
+          <a:p>
+            <a:r>
+              <a:rPr lang="en-US" dirty="0"/>
+              <a:t>Write a </a:t>
+            </a:r>
+            <a:r>
+              <a:rPr lang="en-US" i="1" dirty="0"/>
+              <a:t>thesis</a:t>
+            </a:r>
+            <a:r>
+              <a:rPr lang="en-US" dirty="0"/>
+              <a:t> and give a </a:t>
+            </a:r>
+            <a:r>
+              <a:rPr lang="en-US" i="1" dirty="0"/>
+              <a:t>dissertation</a:t>
+            </a:r>
+            <a:endParaRPr lang="en-US" dirty="0"/>
           </a:p>
           <a:p>
             <a:pPr lvl="1"/>
             <a:r>
               <a:rPr lang="en-US" dirty="0"/>
-              <a:t>Varies depending on the university</a:t>
+              <a:t>Thesis: book of your work</a:t>
             </a:r>
           </a:p>
           <a:p>
             <a:pPr lvl="1"/>
             <a:r>
               <a:rPr lang="en-US" dirty="0"/>
-              <a:t>May involve a written exam</a:t>
+              <a:t>Dissertation: Presentation you give to experts in your field</a:t>
             </a:r>
           </a:p>
           <a:p>
             <a:pPr lvl="1"/>
             <a:r>
               <a:rPr lang="en-US" dirty="0"/>
-              <a:t>May involve reading papers and explaining their results</a:t>
-            </a:r>
-          </a:p>
-          <a:p>
-            <a:r>
-              <a:rPr lang="en-US" dirty="0"/>
-              <a:t>Comprehensive exam / Thesis proposal (1-2 years left)</a:t>
+              <a:t>Publish several academic papers along the way</a:t>
+            </a:r>
+          </a:p>
+          <a:p>
+            <a:r>
+              <a:rPr lang="en-US" dirty="0"/>
+              <a:t>Two types of programs	</a:t>
             </a:r>
           </a:p>
           <a:p>
             <a:pPr lvl="1"/>
             <a:r>
               <a:rPr lang="en-US" dirty="0"/>
-              <a:t>Present a plan for original work that you intend to do</a:t>
+              <a:t>Masters + Ph.D. programs (5-7 years, involves coursework)</a:t>
             </a:r>
           </a:p>
           <a:p>
             <a:pPr lvl="1"/>
             <a:r>
               <a:rPr lang="en-US" dirty="0"/>
-              <a:t>What you think can be learned from it and why it will work</a:t>
-            </a:r>
-          </a:p>
-          <a:p>
-            <a:r>
-              <a:rPr lang="en-US" dirty="0"/>
-              <a:t>Dissertation / Thesis defense</a:t>
-            </a:r>
-          </a:p>
-          <a:p>
-            <a:pPr lvl="1"/>
-            <a:r>
-              <a:rPr lang="en-US" dirty="0"/>
-              <a:t>Present your completed original work</a:t>
-            </a:r>
-          </a:p>
-          <a:p>
-            <a:pPr lvl="1"/>
-            <a:r>
-              <a:rPr lang="en-US" dirty="0"/>
-              <a:t>Open to the public</a:t>
+              <a:t>Post-masters programs (3-5 years, little coursework)</a:t>
             </a:r>
           </a:p>
         </p:txBody>
@@ -5772,7 +5914,7 @@
           <p:cNvPr id="4" name="Slide Number Placeholder 3">
             <a:extLst>
               <a:ext uri="{FF2B5EF4-FFF2-40B4-BE49-F238E27FC236}">
-                <a16:creationId xmlns:a16="http://schemas.microsoft.com/office/drawing/2014/main" id="{6466B327-F346-47B5-A620-798E5882ED5B}"/>
+                <a16:creationId xmlns:a16="http://schemas.microsoft.com/office/drawing/2014/main" id="{4E44AF58-2D8C-4E55-A2CB-12C48E8DF438}"/>
               </a:ext>
             </a:extLst>
           </p:cNvPr>
@@ -5800,7 +5942,7 @@
     </p:spTree>
     <p:extLst>
       <p:ext uri="{BB962C8B-B14F-4D97-AF65-F5344CB8AC3E}">
-        <p14:creationId xmlns:p14="http://schemas.microsoft.com/office/powerpoint/2010/main" val="670529230"/>
+        <p14:creationId xmlns:p14="http://schemas.microsoft.com/office/powerpoint/2010/main" val="1501386158"/>
       </p:ext>
     </p:extLst>
   </p:cSld>
@@ -5832,7 +5974,7 @@
           <p:cNvPr id="2" name="Title 1">
             <a:extLst>
               <a:ext uri="{FF2B5EF4-FFF2-40B4-BE49-F238E27FC236}">
-                <a16:creationId xmlns:a16="http://schemas.microsoft.com/office/drawing/2014/main" id="{0719D2EB-A82A-4188-9B7C-8C38EE39AF2E}"/>
+                <a16:creationId xmlns:a16="http://schemas.microsoft.com/office/drawing/2014/main" id="{50C87B4B-7806-4E61-AD0F-85D33AF898CD}"/>
               </a:ext>
             </a:extLst>
           </p:cNvPr>
@@ -5850,7 +5992,7 @@
           <a:p>
             <a:r>
               <a:rPr lang="en-US" dirty="0"/>
-              <a:t>Getting into Graduate School</a:t>
+              <a:t>Doctorate Degree (Ph.D.) Exams</a:t>
             </a:r>
           </a:p>
         </p:txBody>
@@ -5860,7 +6002,7 @@
           <p:cNvPr id="3" name="Text Placeholder 2">
             <a:extLst>
               <a:ext uri="{FF2B5EF4-FFF2-40B4-BE49-F238E27FC236}">
-                <a16:creationId xmlns:a16="http://schemas.microsoft.com/office/drawing/2014/main" id="{963E676A-385F-4D39-A31E-E611EA85CAF5}"/>
+                <a16:creationId xmlns:a16="http://schemas.microsoft.com/office/drawing/2014/main" id="{5ACA2811-978E-4855-9569-2E199C025032}"/>
               </a:ext>
             </a:extLst>
           </p:cNvPr>
@@ -5878,64 +6020,68 @@
           <a:p>
             <a:r>
               <a:rPr lang="en-US" dirty="0"/>
-              <a:t>Need to fill out an application</a:t>
+              <a:t>Qualifying exam (1-2 years in)</a:t>
             </a:r>
           </a:p>
           <a:p>
             <a:pPr lvl="1"/>
             <a:r>
-              <a:rPr lang="en-US" dirty="0">
-                <a:hlinkClick r:id="rId2"/>
-              </a:rPr>
-              <a:t>https://www.uml.edu/graduate-apply/</a:t>
-            </a:r>
-            <a:endParaRPr lang="en-US" dirty="0"/>
-          </a:p>
-          <a:p>
-            <a:r>
-              <a:rPr lang="en-US" dirty="0"/>
-              <a:t>Need to take an exam</a:t>
+              <a:rPr lang="en-US" dirty="0"/>
+              <a:t>Varies depending on the university</a:t>
             </a:r>
           </a:p>
           <a:p>
             <a:pPr lvl="1"/>
             <a:r>
               <a:rPr lang="en-US" dirty="0"/>
-              <a:t>GRE (standardized test)</a:t>
+              <a:t>May involve a written exam</a:t>
             </a:r>
           </a:p>
           <a:p>
             <a:pPr lvl="1"/>
             <a:r>
               <a:rPr lang="en-US" dirty="0"/>
-              <a:t>TOEFL / IELTS (for international students)</a:t>
+              <a:t>May involve reading papers and explaining their results</a:t>
+            </a:r>
+          </a:p>
+          <a:p>
+            <a:r>
+              <a:rPr lang="en-US" dirty="0"/>
+              <a:t>Comprehensive exam / Thesis proposal (1-2 years left)</a:t>
             </a:r>
           </a:p>
           <a:p>
             <a:pPr lvl="1"/>
             <a:r>
               <a:rPr lang="en-US" dirty="0"/>
-              <a:t>Specialized subjects (not for CS)</a:t>
-            </a:r>
-          </a:p>
-          <a:p>
-            <a:r>
-              <a:rPr lang="en-US" dirty="0"/>
-              <a:t>Letters of Recommendation</a:t>
+              <a:t>Present a plan for original work that you intend to do</a:t>
             </a:r>
           </a:p>
           <a:p>
             <a:pPr lvl="1"/>
             <a:r>
               <a:rPr lang="en-US" dirty="0"/>
-              <a:t>Get at least 1 from a professor who knows you well (400-level elective)</a:t>
+              <a:t>What you think can be learned from it and why it will work</a:t>
+            </a:r>
+          </a:p>
+          <a:p>
+            <a:r>
+              <a:rPr lang="en-US" dirty="0"/>
+              <a:t>Dissertation / Thesis defense</a:t>
             </a:r>
           </a:p>
           <a:p>
             <a:pPr lvl="1"/>
             <a:r>
               <a:rPr lang="en-US" dirty="0"/>
-              <a:t>A recent boss / employer</a:t>
+              <a:t>Present your completed original work</a:t>
+            </a:r>
+          </a:p>
+          <a:p>
+            <a:pPr lvl="1"/>
+            <a:r>
+              <a:rPr lang="en-US" dirty="0"/>
+              <a:t>Open to the public</a:t>
             </a:r>
           </a:p>
         </p:txBody>
@@ -5945,7 +6091,7 @@
           <p:cNvPr id="4" name="Slide Number Placeholder 3">
             <a:extLst>
               <a:ext uri="{FF2B5EF4-FFF2-40B4-BE49-F238E27FC236}">
-                <a16:creationId xmlns:a16="http://schemas.microsoft.com/office/drawing/2014/main" id="{ABDEBF54-1CA8-4049-A74D-BD3FC70E7BFC}"/>
+                <a16:creationId xmlns:a16="http://schemas.microsoft.com/office/drawing/2014/main" id="{6466B327-F346-47B5-A620-798E5882ED5B}"/>
               </a:ext>
             </a:extLst>
           </p:cNvPr>
@@ -5973,7 +6119,7 @@
     </p:spTree>
     <p:extLst>
       <p:ext uri="{BB962C8B-B14F-4D97-AF65-F5344CB8AC3E}">
-        <p14:creationId xmlns:p14="http://schemas.microsoft.com/office/powerpoint/2010/main" val="3019070561"/>
+        <p14:creationId xmlns:p14="http://schemas.microsoft.com/office/powerpoint/2010/main" val="670529230"/>
       </p:ext>
     </p:extLst>
   </p:cSld>
@@ -6005,7 +6151,7 @@
           <p:cNvPr id="2" name="Title 1">
             <a:extLst>
               <a:ext uri="{FF2B5EF4-FFF2-40B4-BE49-F238E27FC236}">
-                <a16:creationId xmlns:a16="http://schemas.microsoft.com/office/drawing/2014/main" id="{E90A0EC4-63E1-47AF-80C8-9AEAB1714522}"/>
+                <a16:creationId xmlns:a16="http://schemas.microsoft.com/office/drawing/2014/main" id="{0719D2EB-A82A-4188-9B7C-8C38EE39AF2E}"/>
               </a:ext>
             </a:extLst>
           </p:cNvPr>
@@ -6023,7 +6169,7 @@
           <a:p>
             <a:r>
               <a:rPr lang="en-US" dirty="0"/>
-              <a:t>Doing Research</a:t>
+              <a:t>Getting into Graduate School</a:t>
             </a:r>
           </a:p>
         </p:txBody>
@@ -6033,7 +6179,7 @@
           <p:cNvPr id="3" name="Text Placeholder 2">
             <a:extLst>
               <a:ext uri="{FF2B5EF4-FFF2-40B4-BE49-F238E27FC236}">
-                <a16:creationId xmlns:a16="http://schemas.microsoft.com/office/drawing/2014/main" id="{56E41D13-C8ED-407F-B220-0606C8B023F9}"/>
+                <a16:creationId xmlns:a16="http://schemas.microsoft.com/office/drawing/2014/main" id="{963E676A-385F-4D39-A31E-E611EA85CAF5}"/>
               </a:ext>
             </a:extLst>
           </p:cNvPr>
@@ -6051,85 +6197,65 @@
           <a:p>
             <a:r>
               <a:rPr lang="en-US" dirty="0"/>
-              <a:t>There are research opportunities available</a:t>
+              <a:t>Need to fill out an application</a:t>
             </a:r>
           </a:p>
           <a:p>
             <a:pPr lvl="1"/>
-            <a:r>
-              <a:rPr lang="en-US" dirty="0"/>
-              <a:t>Department areas: </a:t>
-            </a:r>
             <a:r>
               <a:rPr lang="en-US" dirty="0">
                 <a:hlinkClick r:id="rId2"/>
               </a:rPr>
-              <a:t>https://www.uml.edu/Sciences/computer-science/Research/</a:t>
+              <a:t>https://www.uml.edu/graduate-apply/</a:t>
             </a:r>
             <a:endParaRPr lang="en-US" dirty="0"/>
           </a:p>
           <a:p>
+            <a:r>
+              <a:rPr lang="en-US" dirty="0"/>
+              <a:t>Need to take an exam</a:t>
+            </a:r>
+          </a:p>
+          <a:p>
             <a:pPr lvl="1"/>
             <a:r>
               <a:rPr lang="en-US" dirty="0"/>
-              <a:t>Undergraduate Research Opportunities and Collaborations (UROC):</a:t>
-            </a:r>
-          </a:p>
-          <a:p>
-            <a:pPr lvl="2"/>
-            <a:r>
-              <a:rPr lang="en-US" dirty="0">
-                <a:hlinkClick r:id="rId3"/>
-              </a:rPr>
-              <a:t>https://www.uml.edu/uroc/</a:t>
-            </a:r>
-            <a:endParaRPr lang="en-US" dirty="0"/>
-          </a:p>
-          <a:p>
-            <a:pPr lvl="2"/>
-            <a:r>
-              <a:rPr lang="en-US" dirty="0">
-                <a:hlinkClick r:id="rId4"/>
-              </a:rPr>
-              <a:t>UROC@uml.edu</a:t>
-            </a:r>
-            <a:endParaRPr lang="en-US" dirty="0"/>
-          </a:p>
-          <a:p>
-            <a:r>
-              <a:rPr lang="en-US" dirty="0"/>
-              <a:t>You will need a faculty mentor</a:t>
+              <a:t>GRE (standardized test)</a:t>
             </a:r>
           </a:p>
           <a:p>
             <a:pPr lvl="1"/>
             <a:r>
               <a:rPr lang="en-US" dirty="0"/>
-              <a:t>Look for one whose area interests you</a:t>
-            </a:r>
-          </a:p>
-          <a:p>
-            <a:pPr lvl="2"/>
-            <a:r>
-              <a:rPr lang="en-US" dirty="0"/>
-              <a:t>They will have published papers, so read some recent ones</a:t>
+              <a:t>TOEFL / IELTS (for international students)</a:t>
             </a:r>
           </a:p>
           <a:p>
             <a:pPr lvl="1"/>
             <a:r>
               <a:rPr lang="en-US" dirty="0"/>
-              <a:t>Most won’t mentor you in areas outside of their expertise</a:t>
-            </a:r>
-          </a:p>
-          <a:p>
-            <a:r>
-              <a:rPr lang="en-US" dirty="0"/>
-              <a:t>Many schools offer summer REU opportunities</a:t>
-            </a:r>
-          </a:p>
-          <a:p>
-            <a:endParaRPr lang="en-US" dirty="0"/>
+              <a:t>Specialized subjects (not for CS)</a:t>
+            </a:r>
+          </a:p>
+          <a:p>
+            <a:r>
+              <a:rPr lang="en-US" dirty="0"/>
+              <a:t>Letters of Recommendation</a:t>
+            </a:r>
+          </a:p>
+          <a:p>
+            <a:pPr lvl="1"/>
+            <a:r>
+              <a:rPr lang="en-US" dirty="0"/>
+              <a:t>Get at least 1 from a professor who knows you well (400-level elective)</a:t>
+            </a:r>
+          </a:p>
+          <a:p>
+            <a:pPr lvl="1"/>
+            <a:r>
+              <a:rPr lang="en-US" dirty="0"/>
+              <a:t>A recent boss / employer</a:t>
+            </a:r>
           </a:p>
         </p:txBody>
       </p:sp>
@@ -6138,7 +6264,7 @@
           <p:cNvPr id="4" name="Slide Number Placeholder 3">
             <a:extLst>
               <a:ext uri="{FF2B5EF4-FFF2-40B4-BE49-F238E27FC236}">
-                <a16:creationId xmlns:a16="http://schemas.microsoft.com/office/drawing/2014/main" id="{A79F4665-1903-4CE4-A3F1-492A3B846741}"/>
+                <a16:creationId xmlns:a16="http://schemas.microsoft.com/office/drawing/2014/main" id="{ABDEBF54-1CA8-4049-A74D-BD3FC70E7BFC}"/>
               </a:ext>
             </a:extLst>
           </p:cNvPr>
@@ -6166,7 +6292,7 @@
     </p:spTree>
     <p:extLst>
       <p:ext uri="{BB962C8B-B14F-4D97-AF65-F5344CB8AC3E}">
-        <p14:creationId xmlns:p14="http://schemas.microsoft.com/office/powerpoint/2010/main" val="1862354151"/>
+        <p14:creationId xmlns:p14="http://schemas.microsoft.com/office/powerpoint/2010/main" val="3019070561"/>
       </p:ext>
     </p:extLst>
   </p:cSld>
@@ -6198,7 +6324,7 @@
           <p:cNvPr id="2" name="Title 1">
             <a:extLst>
               <a:ext uri="{FF2B5EF4-FFF2-40B4-BE49-F238E27FC236}">
-                <a16:creationId xmlns:a16="http://schemas.microsoft.com/office/drawing/2014/main" id="{A7548868-9DD5-452B-A68B-C45A6FD63725}"/>
+                <a16:creationId xmlns:a16="http://schemas.microsoft.com/office/drawing/2014/main" id="{E90A0EC4-63E1-47AF-80C8-9AEAB1714522}"/>
               </a:ext>
             </a:extLst>
           </p:cNvPr>
@@ -6216,7 +6342,7 @@
           <a:p>
             <a:r>
               <a:rPr lang="en-US" dirty="0"/>
-              <a:t>Paying for Graduate School</a:t>
+              <a:t>Doing Research</a:t>
             </a:r>
           </a:p>
         </p:txBody>
@@ -6226,7 +6352,7 @@
           <p:cNvPr id="3" name="Text Placeholder 2">
             <a:extLst>
               <a:ext uri="{FF2B5EF4-FFF2-40B4-BE49-F238E27FC236}">
-                <a16:creationId xmlns:a16="http://schemas.microsoft.com/office/drawing/2014/main" id="{EC62A7A3-0AD3-4B35-BAC2-48029F34D174}"/>
+                <a16:creationId xmlns:a16="http://schemas.microsoft.com/office/drawing/2014/main" id="{56E41D13-C8ED-407F-B220-0606C8B023F9}"/>
               </a:ext>
             </a:extLst>
           </p:cNvPr>
@@ -6244,63 +6370,85 @@
           <a:p>
             <a:r>
               <a:rPr lang="en-US" dirty="0"/>
-              <a:t>You should not be paying full-price for graduate school in Computer Science</a:t>
+              <a:t>There are research opportunities available</a:t>
             </a:r>
           </a:p>
           <a:p>
             <a:pPr lvl="1"/>
             <a:r>
               <a:rPr lang="en-US" dirty="0"/>
-              <a:t>Education support from your employer</a:t>
+              <a:t>Department areas: </a:t>
+            </a:r>
+            <a:r>
+              <a:rPr lang="en-US" dirty="0">
+                <a:hlinkClick r:id="rId2"/>
+              </a:rPr>
+              <a:t>https://www.uml.edu/Sciences/computer-science/Research/</a:t>
+            </a:r>
+            <a:endParaRPr lang="en-US" dirty="0"/>
+          </a:p>
+          <a:p>
+            <a:pPr lvl="1"/>
+            <a:r>
+              <a:rPr lang="en-US" dirty="0"/>
+              <a:t>Undergraduate Research Opportunities and Collaborations (UROC):</a:t>
             </a:r>
           </a:p>
           <a:p>
             <a:pPr lvl="2"/>
             <a:r>
-              <a:rPr lang="en-US" dirty="0"/>
-              <a:t>Most commonly for master’s students</a:t>
-            </a:r>
+              <a:rPr lang="en-US" dirty="0">
+                <a:hlinkClick r:id="rId3"/>
+              </a:rPr>
+              <a:t>https://www.uml.edu/uroc/</a:t>
+            </a:r>
+            <a:endParaRPr lang="en-US" dirty="0"/>
           </a:p>
           <a:p>
             <a:pPr lvl="2"/>
             <a:r>
-              <a:rPr lang="en-US" dirty="0"/>
-              <a:t>They cover part of your tuition while you continue working for them</a:t>
+              <a:rPr lang="en-US" dirty="0">
+                <a:hlinkClick r:id="rId4"/>
+              </a:rPr>
+              <a:t>UROC@uml.edu</a:t>
+            </a:r>
+            <a:endParaRPr lang="en-US" dirty="0"/>
+          </a:p>
+          <a:p>
+            <a:r>
+              <a:rPr lang="en-US" dirty="0"/>
+              <a:t>You will need a faculty mentor</a:t>
             </a:r>
           </a:p>
           <a:p>
             <a:pPr lvl="1"/>
             <a:r>
               <a:rPr lang="en-US" dirty="0"/>
-              <a:t>Tuition credits from the university</a:t>
+              <a:t>Look for one whose area interests you</a:t>
             </a:r>
           </a:p>
           <a:p>
             <a:pPr lvl="2"/>
             <a:r>
               <a:rPr lang="en-US" dirty="0"/>
-              <a:t>Research Assistant (RA) or Teaching Assistant (TA) positions</a:t>
-            </a:r>
-          </a:p>
-          <a:p>
-            <a:pPr lvl="2"/>
-            <a:r>
-              <a:rPr lang="en-US" dirty="0"/>
-              <a:t>The university pays you a small stipend and waives your tuition</a:t>
-            </a:r>
-          </a:p>
-          <a:p>
-            <a:r>
-              <a:rPr lang="en-US" dirty="0"/>
-              <a:t>Many schools have TA unions</a:t>
+              <a:t>They will have published papers, so read some recent ones</a:t>
             </a:r>
           </a:p>
           <a:p>
             <a:pPr lvl="1"/>
             <a:r>
               <a:rPr lang="en-US" dirty="0"/>
-              <a:t>Tend to have better pay and benefits</a:t>
-            </a:r>
+              <a:t>Most won’t mentor you in areas outside of their expertise</a:t>
+            </a:r>
+          </a:p>
+          <a:p>
+            <a:r>
+              <a:rPr lang="en-US" dirty="0"/>
+              <a:t>Many schools offer summer REU opportunities</a:t>
+            </a:r>
+          </a:p>
+          <a:p>
+            <a:endParaRPr lang="en-US" dirty="0"/>
           </a:p>
         </p:txBody>
       </p:sp>
@@ -6309,7 +6457,7 @@
           <p:cNvPr id="4" name="Slide Number Placeholder 3">
             <a:extLst>
               <a:ext uri="{FF2B5EF4-FFF2-40B4-BE49-F238E27FC236}">
-                <a16:creationId xmlns:a16="http://schemas.microsoft.com/office/drawing/2014/main" id="{7288F4CE-DFEB-4FCD-8FC1-A5E2C8EA3859}"/>
+                <a16:creationId xmlns:a16="http://schemas.microsoft.com/office/drawing/2014/main" id="{A79F4665-1903-4CE4-A3F1-492A3B846741}"/>
               </a:ext>
             </a:extLst>
           </p:cNvPr>
@@ -6337,7 +6485,7 @@
     </p:spTree>
     <p:extLst>
       <p:ext uri="{BB962C8B-B14F-4D97-AF65-F5344CB8AC3E}">
-        <p14:creationId xmlns:p14="http://schemas.microsoft.com/office/powerpoint/2010/main" val="1941390288"/>
+        <p14:creationId xmlns:p14="http://schemas.microsoft.com/office/powerpoint/2010/main" val="1862354151"/>
       </p:ext>
     </p:extLst>
   </p:cSld>

</xml_diff>